<commit_message>
Support Visuel Hugo pour revue 0
Ajout de diapositive et modification de certain diagramme
</commit_message>
<xml_diff>
--- a/Analyse/Hugo/Support Revue 0 Hugo.pptx
+++ b/Analyse/Hugo/Support Revue 0 Hugo.pptx
@@ -7,13 +7,14 @@
   <p:sldIdLst>
     <p:sldId id="256" r:id="rId2"/>
     <p:sldId id="257" r:id="rId3"/>
-    <p:sldId id="258" r:id="rId4"/>
+    <p:sldId id="263" r:id="rId4"/>
     <p:sldId id="259" r:id="rId5"/>
     <p:sldId id="260" r:id="rId6"/>
     <p:sldId id="261" r:id="rId7"/>
-    <p:sldId id="262" r:id="rId8"/>
-    <p:sldId id="263" r:id="rId9"/>
+    <p:sldId id="258" r:id="rId8"/>
+    <p:sldId id="262" r:id="rId9"/>
     <p:sldId id="264" r:id="rId10"/>
+    <p:sldId id="265" r:id="rId11"/>
   </p:sldIdLst>
   <p:sldSz cx="12192000" cy="6858000"/>
   <p:notesSz cx="6858000" cy="9144000"/>
@@ -112,6 +113,11 @@
       </a:defRPr>
     </a:lvl9pPr>
   </p:defaultTextStyle>
+  <p:extLst>
+    <p:ext uri="{EFAFB233-063F-42B5-8137-9DF3F51BA10A}">
+      <p15:sldGuideLst xmlns:p15="http://schemas.microsoft.com/office/powerpoint/2012/main"/>
+    </p:ext>
+  </p:extLst>
 </p:presentation>
 </file>
 
@@ -210,7 +216,7 @@
           <a:effectLst/>
           <a:extLst>
             <a:ext uri="{91240B29-F687-4f45-9708-019B960494DF}">
-              <a14:hiddenLine xmlns:a14="http://schemas.microsoft.com/office/drawing/2010/main" xmlns="" w="9525">
+              <a14:hiddenLine xmlns="" xmlns:a14="http://schemas.microsoft.com/office/drawing/2010/main" w="9525">
                 <a:solidFill>
                   <a:srgbClr val="000000"/>
                 </a:solidFill>
@@ -402,7 +408,7 @@
           <a:p>
             <a:fld id="{EEC496E0-85D6-4C9F-B8AF-FD07868676CE}" type="datetimeFigureOut">
               <a:rPr lang="fr-FR" smtClean="0"/>
-              <a:t>02/03/2022</a:t>
+              <a:t>03/03/2022</a:t>
             </a:fld>
             <a:endParaRPr lang="fr-FR"/>
           </a:p>
@@ -460,13 +466,13 @@
   <p:clrMapOvr>
     <a:masterClrMapping/>
   </p:clrMapOvr>
-  <mc:AlternateContent xmlns:mc="http://schemas.openxmlformats.org/markup-compatibility/2006">
-    <mc:Choice xmlns:p14="http://schemas.microsoft.com/office/powerpoint/2010/main" Requires="p14">
+  <mc:AlternateContent xmlns:mc="http://schemas.openxmlformats.org/markup-compatibility/2006" xmlns:p14="http://schemas.microsoft.com/office/powerpoint/2010/main">
+    <mc:Choice Requires="p14">
       <p:transition spd="slow" p14:dur="3400">
         <p14:reveal/>
       </p:transition>
     </mc:Choice>
-    <mc:Fallback>
+    <mc:Fallback xmlns="">
       <p:transition spd="slow">
         <p:fade/>
       </p:transition>
@@ -732,7 +738,7 @@
           <a:p>
             <a:fld id="{EEC496E0-85D6-4C9F-B8AF-FD07868676CE}" type="datetimeFigureOut">
               <a:rPr lang="fr-FR" smtClean="0"/>
-              <a:t>02/03/2022</a:t>
+              <a:t>03/03/2022</a:t>
             </a:fld>
             <a:endParaRPr lang="fr-FR"/>
           </a:p>
@@ -790,13 +796,13 @@
   <p:clrMapOvr>
     <a:masterClrMapping/>
   </p:clrMapOvr>
-  <mc:AlternateContent xmlns:mc="http://schemas.openxmlformats.org/markup-compatibility/2006">
-    <mc:Choice xmlns:p14="http://schemas.microsoft.com/office/powerpoint/2010/main" Requires="p14">
+  <mc:AlternateContent xmlns:mc="http://schemas.openxmlformats.org/markup-compatibility/2006" xmlns:p14="http://schemas.microsoft.com/office/powerpoint/2010/main">
+    <mc:Choice Requires="p14">
       <p:transition spd="slow" p14:dur="3400">
         <p14:reveal/>
       </p:transition>
     </mc:Choice>
-    <mc:Fallback>
+    <mc:Fallback xmlns="">
       <p:transition spd="slow">
         <p:fade/>
       </p:transition>
@@ -1232,7 +1238,7 @@
           <a:p>
             <a:fld id="{EEC496E0-85D6-4C9F-B8AF-FD07868676CE}" type="datetimeFigureOut">
               <a:rPr lang="fr-FR" smtClean="0"/>
-              <a:t>02/03/2022</a:t>
+              <a:t>03/03/2022</a:t>
             </a:fld>
             <a:endParaRPr lang="fr-FR"/>
           </a:p>
@@ -1290,13 +1296,13 @@
   <p:clrMapOvr>
     <a:masterClrMapping/>
   </p:clrMapOvr>
-  <mc:AlternateContent xmlns:mc="http://schemas.openxmlformats.org/markup-compatibility/2006">
-    <mc:Choice xmlns:p14="http://schemas.microsoft.com/office/powerpoint/2010/main" Requires="p14">
+  <mc:AlternateContent xmlns:mc="http://schemas.openxmlformats.org/markup-compatibility/2006" xmlns:p14="http://schemas.microsoft.com/office/powerpoint/2010/main">
+    <mc:Choice Requires="p14">
       <p:transition spd="slow" p14:dur="3400">
         <p14:reveal/>
       </p:transition>
     </mc:Choice>
-    <mc:Fallback>
+    <mc:Fallback xmlns="">
       <p:transition spd="slow">
         <p:fade/>
       </p:transition>
@@ -1613,7 +1619,7 @@
           <a:p>
             <a:fld id="{EEC496E0-85D6-4C9F-B8AF-FD07868676CE}" type="datetimeFigureOut">
               <a:rPr lang="fr-FR" smtClean="0"/>
-              <a:t>02/03/2022</a:t>
+              <a:t>03/03/2022</a:t>
             </a:fld>
             <a:endParaRPr lang="fr-FR"/>
           </a:p>
@@ -1671,13 +1677,13 @@
   <p:clrMapOvr>
     <a:masterClrMapping/>
   </p:clrMapOvr>
-  <mc:AlternateContent xmlns:mc="http://schemas.openxmlformats.org/markup-compatibility/2006">
-    <mc:Choice xmlns:p14="http://schemas.microsoft.com/office/powerpoint/2010/main" Requires="p14">
+  <mc:AlternateContent xmlns:mc="http://schemas.openxmlformats.org/markup-compatibility/2006" xmlns:p14="http://schemas.microsoft.com/office/powerpoint/2010/main">
+    <mc:Choice Requires="p14">
       <p:transition spd="slow" p14:dur="3400">
         <p14:reveal/>
       </p:transition>
     </mc:Choice>
-    <mc:Fallback>
+    <mc:Fallback xmlns="">
       <p:transition spd="slow">
         <p:fade/>
       </p:transition>
@@ -1780,7 +1786,7 @@
           <a:ln/>
           <a:extLst>
             <a:ext uri="{91240B29-F687-4f45-9708-019B960494DF}">
-              <a14:hiddenLine xmlns:a14="http://schemas.microsoft.com/office/drawing/2010/main" xmlns="" w="9525">
+              <a14:hiddenLine xmlns="" xmlns:a14="http://schemas.microsoft.com/office/drawing/2010/main" w="9525">
                 <a:solidFill>
                   <a:srgbClr val="000000"/>
                 </a:solidFill>
@@ -1898,7 +1904,7 @@
           <a:p>
             <a:fld id="{EEC496E0-85D6-4C9F-B8AF-FD07868676CE}" type="datetimeFigureOut">
               <a:rPr lang="fr-FR" smtClean="0"/>
-              <a:t>02/03/2022</a:t>
+              <a:t>03/03/2022</a:t>
             </a:fld>
             <a:endParaRPr lang="fr-FR"/>
           </a:p>
@@ -1956,13 +1962,13 @@
   <p:clrMapOvr>
     <a:masterClrMapping/>
   </p:clrMapOvr>
-  <mc:AlternateContent xmlns:mc="http://schemas.openxmlformats.org/markup-compatibility/2006">
-    <mc:Choice xmlns:p14="http://schemas.microsoft.com/office/powerpoint/2010/main" Requires="p14">
+  <mc:AlternateContent xmlns:mc="http://schemas.openxmlformats.org/markup-compatibility/2006" xmlns:p14="http://schemas.microsoft.com/office/powerpoint/2010/main">
+    <mc:Choice Requires="p14">
       <p:transition spd="slow" p14:dur="3400">
         <p14:reveal/>
       </p:transition>
     </mc:Choice>
-    <mc:Fallback>
+    <mc:Fallback xmlns="">
       <p:transition spd="slow">
         <p:fade/>
       </p:transition>
@@ -2067,7 +2073,7 @@
           <a:ln/>
           <a:extLst>
             <a:ext uri="{91240B29-F687-4f45-9708-019B960494DF}">
-              <a14:hiddenLine xmlns:a14="http://schemas.microsoft.com/office/drawing/2010/main" xmlns="" w="9525">
+              <a14:hiddenLine xmlns="" xmlns:a14="http://schemas.microsoft.com/office/drawing/2010/main" w="9525">
                 <a:solidFill>
                   <a:srgbClr val="000000"/>
                 </a:solidFill>
@@ -2195,7 +2201,7 @@
           <a:p>
             <a:fld id="{EEC496E0-85D6-4C9F-B8AF-FD07868676CE}" type="datetimeFigureOut">
               <a:rPr lang="fr-FR" smtClean="0"/>
-              <a:t>02/03/2022</a:t>
+              <a:t>03/03/2022</a:t>
             </a:fld>
             <a:endParaRPr lang="fr-FR"/>
           </a:p>
@@ -2253,13 +2259,13 @@
   <p:clrMapOvr>
     <a:masterClrMapping/>
   </p:clrMapOvr>
-  <mc:AlternateContent xmlns:mc="http://schemas.openxmlformats.org/markup-compatibility/2006">
-    <mc:Choice xmlns:p14="http://schemas.microsoft.com/office/powerpoint/2010/main" Requires="p14">
+  <mc:AlternateContent xmlns:mc="http://schemas.openxmlformats.org/markup-compatibility/2006" xmlns:p14="http://schemas.microsoft.com/office/powerpoint/2010/main">
+    <mc:Choice Requires="p14">
       <p:transition spd="slow" p14:dur="3400">
         <p14:reveal/>
       </p:transition>
     </mc:Choice>
-    <mc:Fallback>
+    <mc:Fallback xmlns="">
       <p:transition spd="slow">
         <p:fade/>
       </p:transition>
@@ -2362,7 +2368,7 @@
           <a:ln/>
           <a:extLst>
             <a:ext uri="{91240B29-F687-4f45-9708-019B960494DF}">
-              <a14:hiddenLine xmlns:a14="http://schemas.microsoft.com/office/drawing/2010/main" xmlns="" w="9525">
+              <a14:hiddenLine xmlns="" xmlns:a14="http://schemas.microsoft.com/office/drawing/2010/main" w="9525">
                 <a:solidFill>
                   <a:srgbClr val="000000"/>
                 </a:solidFill>
@@ -2490,7 +2496,7 @@
           <a:p>
             <a:fld id="{EEC496E0-85D6-4C9F-B8AF-FD07868676CE}" type="datetimeFigureOut">
               <a:rPr lang="fr-FR" smtClean="0"/>
-              <a:t>02/03/2022</a:t>
+              <a:t>03/03/2022</a:t>
             </a:fld>
             <a:endParaRPr lang="fr-FR"/>
           </a:p>
@@ -2548,13 +2554,13 @@
   <p:clrMapOvr>
     <a:masterClrMapping/>
   </p:clrMapOvr>
-  <mc:AlternateContent xmlns:mc="http://schemas.openxmlformats.org/markup-compatibility/2006">
-    <mc:Choice xmlns:p14="http://schemas.microsoft.com/office/powerpoint/2010/main" Requires="p14">
+  <mc:AlternateContent xmlns:mc="http://schemas.openxmlformats.org/markup-compatibility/2006" xmlns:p14="http://schemas.microsoft.com/office/powerpoint/2010/main">
+    <mc:Choice Requires="p14">
       <p:transition spd="slow" p14:dur="3400">
         <p14:reveal/>
       </p:transition>
     </mc:Choice>
-    <mc:Fallback>
+    <mc:Fallback xmlns="">
       <p:transition spd="slow">
         <p:fade/>
       </p:transition>
@@ -2845,7 +2851,7 @@
           <a:p>
             <a:fld id="{EEC496E0-85D6-4C9F-B8AF-FD07868676CE}" type="datetimeFigureOut">
               <a:rPr lang="fr-FR" smtClean="0"/>
-              <a:t>02/03/2022</a:t>
+              <a:t>03/03/2022</a:t>
             </a:fld>
             <a:endParaRPr lang="fr-FR"/>
           </a:p>
@@ -2903,13 +2909,13 @@
   <p:clrMapOvr>
     <a:masterClrMapping/>
   </p:clrMapOvr>
-  <mc:AlternateContent xmlns:mc="http://schemas.openxmlformats.org/markup-compatibility/2006">
-    <mc:Choice xmlns:p14="http://schemas.microsoft.com/office/powerpoint/2010/main" Requires="p14">
+  <mc:AlternateContent xmlns:mc="http://schemas.openxmlformats.org/markup-compatibility/2006" xmlns:p14="http://schemas.microsoft.com/office/powerpoint/2010/main">
+    <mc:Choice Requires="p14">
       <p:transition spd="slow" p14:dur="3400">
         <p14:reveal/>
       </p:transition>
     </mc:Choice>
-    <mc:Fallback>
+    <mc:Fallback xmlns="">
       <p:transition spd="slow">
         <p:fade/>
       </p:transition>
@@ -3012,7 +3018,7 @@
           <a:ln/>
           <a:extLst>
             <a:ext uri="{91240B29-F687-4f45-9708-019B960494DF}">
-              <a14:hiddenLine xmlns:a14="http://schemas.microsoft.com/office/drawing/2010/main" xmlns="" w="9525">
+              <a14:hiddenLine xmlns="" xmlns:a14="http://schemas.microsoft.com/office/drawing/2010/main" w="9525">
                 <a:solidFill>
                   <a:srgbClr val="000000"/>
                 </a:solidFill>
@@ -3196,7 +3202,7 @@
           <a:p>
             <a:fld id="{EEC496E0-85D6-4C9F-B8AF-FD07868676CE}" type="datetimeFigureOut">
               <a:rPr lang="fr-FR" smtClean="0"/>
-              <a:t>02/03/2022</a:t>
+              <a:t>03/03/2022</a:t>
             </a:fld>
             <a:endParaRPr lang="fr-FR"/>
           </a:p>
@@ -3254,13 +3260,13 @@
   <p:clrMapOvr>
     <a:masterClrMapping/>
   </p:clrMapOvr>
-  <mc:AlternateContent xmlns:mc="http://schemas.openxmlformats.org/markup-compatibility/2006">
-    <mc:Choice xmlns:p14="http://schemas.microsoft.com/office/powerpoint/2010/main" Requires="p14">
+  <mc:AlternateContent xmlns:mc="http://schemas.openxmlformats.org/markup-compatibility/2006" xmlns:p14="http://schemas.microsoft.com/office/powerpoint/2010/main">
+    <mc:Choice Requires="p14">
       <p:transition spd="slow" p14:dur="3400">
         <p14:reveal/>
       </p:transition>
     </mc:Choice>
-    <mc:Fallback>
+    <mc:Fallback xmlns="">
       <p:transition spd="slow">
         <p:fade/>
       </p:transition>
@@ -3363,7 +3369,7 @@
           <a:ln/>
           <a:extLst>
             <a:ext uri="{91240B29-F687-4f45-9708-019B960494DF}">
-              <a14:hiddenLine xmlns:a14="http://schemas.microsoft.com/office/drawing/2010/main" xmlns="" w="9525">
+              <a14:hiddenLine xmlns="" xmlns:a14="http://schemas.microsoft.com/office/drawing/2010/main" w="9525">
                 <a:solidFill>
                   <a:srgbClr val="000000"/>
                 </a:solidFill>
@@ -3685,7 +3691,7 @@
           <a:p>
             <a:fld id="{EEC496E0-85D6-4C9F-B8AF-FD07868676CE}" type="datetimeFigureOut">
               <a:rPr lang="fr-FR" smtClean="0"/>
-              <a:t>02/03/2022</a:t>
+              <a:t>03/03/2022</a:t>
             </a:fld>
             <a:endParaRPr lang="fr-FR"/>
           </a:p>
@@ -3743,13 +3749,13 @@
   <p:clrMapOvr>
     <a:masterClrMapping/>
   </p:clrMapOvr>
-  <mc:AlternateContent xmlns:mc="http://schemas.openxmlformats.org/markup-compatibility/2006">
-    <mc:Choice xmlns:p14="http://schemas.microsoft.com/office/powerpoint/2010/main" Requires="p14">
+  <mc:AlternateContent xmlns:mc="http://schemas.openxmlformats.org/markup-compatibility/2006" xmlns:p14="http://schemas.microsoft.com/office/powerpoint/2010/main">
+    <mc:Choice Requires="p14">
       <p:transition spd="slow" p14:dur="3400">
         <p14:reveal/>
       </p:transition>
     </mc:Choice>
-    <mc:Fallback>
+    <mc:Fallback xmlns="">
       <p:transition spd="slow">
         <p:fade/>
       </p:transition>
@@ -3852,7 +3858,7 @@
           <a:ln/>
           <a:extLst>
             <a:ext uri="{91240B29-F687-4f45-9708-019B960494DF}">
-              <a14:hiddenLine xmlns:a14="http://schemas.microsoft.com/office/drawing/2010/main" xmlns="" w="9525">
+              <a14:hiddenLine xmlns="" xmlns:a14="http://schemas.microsoft.com/office/drawing/2010/main" w="9525">
                 <a:solidFill>
                   <a:srgbClr val="000000"/>
                 </a:solidFill>
@@ -3918,7 +3924,7 @@
           <a:p>
             <a:fld id="{EEC496E0-85D6-4C9F-B8AF-FD07868676CE}" type="datetimeFigureOut">
               <a:rPr lang="fr-FR" smtClean="0"/>
-              <a:t>02/03/2022</a:t>
+              <a:t>03/03/2022</a:t>
             </a:fld>
             <a:endParaRPr lang="fr-FR"/>
           </a:p>
@@ -3976,13 +3982,13 @@
   <p:clrMapOvr>
     <a:masterClrMapping/>
   </p:clrMapOvr>
-  <mc:AlternateContent xmlns:mc="http://schemas.openxmlformats.org/markup-compatibility/2006">
-    <mc:Choice xmlns:p14="http://schemas.microsoft.com/office/powerpoint/2010/main" Requires="p14">
+  <mc:AlternateContent xmlns:mc="http://schemas.openxmlformats.org/markup-compatibility/2006" xmlns:p14="http://schemas.microsoft.com/office/powerpoint/2010/main">
+    <mc:Choice Requires="p14">
       <p:transition spd="slow" p14:dur="3400">
         <p14:reveal/>
       </p:transition>
     </mc:Choice>
-    <mc:Fallback>
+    <mc:Fallback xmlns="">
       <p:transition spd="slow">
         <p:fade/>
       </p:transition>
@@ -4025,7 +4031,7 @@
           <a:p>
             <a:fld id="{EEC496E0-85D6-4C9F-B8AF-FD07868676CE}" type="datetimeFigureOut">
               <a:rPr lang="fr-FR" smtClean="0"/>
-              <a:t>02/03/2022</a:t>
+              <a:t>03/03/2022</a:t>
             </a:fld>
             <a:endParaRPr lang="fr-FR"/>
           </a:p>
@@ -4083,13 +4089,13 @@
   <p:clrMapOvr>
     <a:masterClrMapping/>
   </p:clrMapOvr>
-  <mc:AlternateContent xmlns:mc="http://schemas.openxmlformats.org/markup-compatibility/2006">
-    <mc:Choice xmlns:p14="http://schemas.microsoft.com/office/powerpoint/2010/main" Requires="p14">
+  <mc:AlternateContent xmlns:mc="http://schemas.openxmlformats.org/markup-compatibility/2006" xmlns:p14="http://schemas.microsoft.com/office/powerpoint/2010/main">
+    <mc:Choice Requires="p14">
       <p:transition spd="slow" p14:dur="3400">
         <p14:reveal/>
       </p:transition>
     </mc:Choice>
-    <mc:Fallback>
+    <mc:Fallback xmlns="">
       <p:transition spd="slow">
         <p:fade/>
       </p:transition>
@@ -4305,7 +4311,7 @@
           <a:ln/>
           <a:extLst>
             <a:ext uri="{91240B29-F687-4f45-9708-019B960494DF}">
-              <a14:hiddenLine xmlns:a14="http://schemas.microsoft.com/office/drawing/2010/main" xmlns="" w="9525">
+              <a14:hiddenLine xmlns="" xmlns:a14="http://schemas.microsoft.com/office/drawing/2010/main" w="9525">
                 <a:solidFill>
                   <a:srgbClr val="000000"/>
                 </a:solidFill>
@@ -4504,7 +4510,7 @@
           <a:p>
             <a:fld id="{EEC496E0-85D6-4C9F-B8AF-FD07868676CE}" type="datetimeFigureOut">
               <a:rPr lang="fr-FR" smtClean="0"/>
-              <a:t>02/03/2022</a:t>
+              <a:t>03/03/2022</a:t>
             </a:fld>
             <a:endParaRPr lang="fr-FR"/>
           </a:p>
@@ -4562,13 +4568,13 @@
   <p:clrMapOvr>
     <a:masterClrMapping/>
   </p:clrMapOvr>
-  <mc:AlternateContent xmlns:mc="http://schemas.openxmlformats.org/markup-compatibility/2006">
-    <mc:Choice xmlns:p14="http://schemas.microsoft.com/office/powerpoint/2010/main" Requires="p14">
+  <mc:AlternateContent xmlns:mc="http://schemas.openxmlformats.org/markup-compatibility/2006" xmlns:p14="http://schemas.microsoft.com/office/powerpoint/2010/main">
+    <mc:Choice Requires="p14">
       <p:transition spd="slow" p14:dur="3400">
         <p14:reveal/>
       </p:transition>
     </mc:Choice>
-    <mc:Fallback>
+    <mc:Fallback xmlns="">
       <p:transition spd="slow">
         <p:fade/>
       </p:transition>
@@ -4829,7 +4835,7 @@
           <a:p>
             <a:fld id="{EEC496E0-85D6-4C9F-B8AF-FD07868676CE}" type="datetimeFigureOut">
               <a:rPr lang="fr-FR" smtClean="0"/>
-              <a:t>02/03/2022</a:t>
+              <a:t>03/03/2022</a:t>
             </a:fld>
             <a:endParaRPr lang="fr-FR"/>
           </a:p>
@@ -4897,13 +4903,13 @@
   <p:clrMapOvr>
     <a:masterClrMapping/>
   </p:clrMapOvr>
-  <mc:AlternateContent xmlns:mc="http://schemas.openxmlformats.org/markup-compatibility/2006">
-    <mc:Choice xmlns:p14="http://schemas.microsoft.com/office/powerpoint/2010/main" Requires="p14">
+  <mc:AlternateContent xmlns:mc="http://schemas.openxmlformats.org/markup-compatibility/2006" xmlns:p14="http://schemas.microsoft.com/office/powerpoint/2010/main">
+    <mc:Choice Requires="p14">
       <p:transition spd="slow" p14:dur="3400">
         <p14:reveal/>
       </p:transition>
     </mc:Choice>
-    <mc:Fallback>
+    <mc:Fallback xmlns="">
       <p:transition spd="slow">
         <p:fade/>
       </p:transition>
@@ -5111,7 +5117,7 @@
           <a:p>
             <a:fld id="{EEC496E0-85D6-4C9F-B8AF-FD07868676CE}" type="datetimeFigureOut">
               <a:rPr lang="fr-FR" smtClean="0"/>
-              <a:t>02/03/2022</a:t>
+              <a:t>03/03/2022</a:t>
             </a:fld>
             <a:endParaRPr lang="fr-FR"/>
           </a:p>
@@ -5180,13 +5186,13 @@
     <p:sldLayoutId id="2147483673" r:id="rId13"/>
     <p:sldLayoutId id="2147483674" r:id="rId14"/>
   </p:sldLayoutIdLst>
-  <mc:AlternateContent xmlns:mc="http://schemas.openxmlformats.org/markup-compatibility/2006">
-    <mc:Choice xmlns:p14="http://schemas.microsoft.com/office/powerpoint/2010/main" Requires="p14">
+  <mc:AlternateContent xmlns:mc="http://schemas.openxmlformats.org/markup-compatibility/2006" xmlns:p14="http://schemas.microsoft.com/office/powerpoint/2010/main">
+    <mc:Choice Requires="p14">
       <p:transition spd="slow" p14:dur="3400">
         <p14:reveal/>
       </p:transition>
     </mc:Choice>
-    <mc:Fallback>
+    <mc:Fallback xmlns="">
       <p:transition spd="slow">
         <p:fade/>
       </p:transition>
@@ -5693,13 +5699,113 @@
   <p:clrMapOvr>
     <a:masterClrMapping/>
   </p:clrMapOvr>
-  <mc:AlternateContent xmlns:mc="http://schemas.openxmlformats.org/markup-compatibility/2006">
-    <mc:Choice xmlns:p14="http://schemas.microsoft.com/office/powerpoint/2010/main" Requires="p14">
+  <mc:AlternateContent xmlns:mc="http://schemas.openxmlformats.org/markup-compatibility/2006" xmlns:p14="http://schemas.microsoft.com/office/powerpoint/2010/main">
+    <mc:Choice Requires="p14">
       <p:transition spd="slow" p14:dur="3400">
         <p14:reveal/>
       </p:transition>
     </mc:Choice>
-    <mc:Fallback>
+    <mc:Fallback xmlns="">
+      <p:transition spd="slow">
+        <p:fade/>
+      </p:transition>
+    </mc:Fallback>
+  </mc:AlternateContent>
+</p:sld>
+</file>
+
+<file path=ppt/slides/slide10.xml><?xml version="1.0" encoding="utf-8"?>
+<p:sld xmlns:a="http://schemas.openxmlformats.org/drawingml/2006/main" xmlns:r="http://schemas.openxmlformats.org/officeDocument/2006/relationships" xmlns:p="http://schemas.openxmlformats.org/presentationml/2006/main">
+  <p:cSld>
+    <p:spTree>
+      <p:nvGrpSpPr>
+        <p:cNvPr id="1" name=""/>
+        <p:cNvGrpSpPr/>
+        <p:nvPr/>
+      </p:nvGrpSpPr>
+      <p:grpSpPr>
+        <a:xfrm>
+          <a:off x="0" y="0"/>
+          <a:ext cx="0" cy="0"/>
+          <a:chOff x="0" y="0"/>
+          <a:chExt cx="0" cy="0"/>
+        </a:xfrm>
+      </p:grpSpPr>
+      <p:sp>
+        <p:nvSpPr>
+          <p:cNvPr id="2" name="Titre 1">
+            <a:extLst>
+              <a:ext uri="{FF2B5EF4-FFF2-40B4-BE49-F238E27FC236}">
+                <a16:creationId xmlns:a16="http://schemas.microsoft.com/office/drawing/2014/main" id="{147BC163-2714-4B4F-93C8-D954013105CB}"/>
+              </a:ext>
+            </a:extLst>
+          </p:cNvPr>
+          <p:cNvSpPr>
+            <a:spLocks noGrp="1"/>
+          </p:cNvSpPr>
+          <p:nvPr>
+            <p:ph type="title"/>
+          </p:nvPr>
+        </p:nvSpPr>
+        <p:spPr/>
+        <p:txBody>
+          <a:bodyPr/>
+          <a:lstStyle/>
+          <a:p>
+            <a:r>
+              <a:rPr lang="fr-FR" dirty="0"/>
+              <a:t>Diagramme d’utilisation</a:t>
+            </a:r>
+          </a:p>
+        </p:txBody>
+      </p:sp>
+      <p:pic>
+        <p:nvPicPr>
+          <p:cNvPr id="4" name="Image 3">
+            <a:extLst>
+              <a:ext uri="{FF2B5EF4-FFF2-40B4-BE49-F238E27FC236}">
+                <a16:creationId xmlns:a16="http://schemas.microsoft.com/office/drawing/2014/main" id="{4BF8E160-EA7E-4123-A227-5287D52008D7}"/>
+              </a:ext>
+            </a:extLst>
+          </p:cNvPr>
+          <p:cNvPicPr>
+            <a:picLocks noChangeAspect="1"/>
+          </p:cNvPicPr>
+          <p:nvPr/>
+        </p:nvPicPr>
+        <p:blipFill>
+          <a:blip r:embed="rId2"/>
+          <a:stretch>
+            <a:fillRect/>
+          </a:stretch>
+        </p:blipFill>
+        <p:spPr>
+          <a:xfrm>
+            <a:off x="987651" y="2288677"/>
+            <a:ext cx="10394347" cy="4394478"/>
+          </a:xfrm>
+          <a:prstGeom prst="rect">
+            <a:avLst/>
+          </a:prstGeom>
+        </p:spPr>
+      </p:pic>
+    </p:spTree>
+    <p:extLst>
+      <p:ext uri="{BB962C8B-B14F-4D97-AF65-F5344CB8AC3E}">
+        <p14:creationId xmlns:p14="http://schemas.microsoft.com/office/powerpoint/2010/main" val="775337358"/>
+      </p:ext>
+    </p:extLst>
+  </p:cSld>
+  <p:clrMapOvr>
+    <a:masterClrMapping/>
+  </p:clrMapOvr>
+  <mc:AlternateContent xmlns:mc="http://schemas.openxmlformats.org/markup-compatibility/2006" xmlns:p14="http://schemas.microsoft.com/office/powerpoint/2010/main">
+    <mc:Choice Requires="p14">
+      <p:transition spd="slow" p14:dur="3400">
+        <p14:reveal/>
+      </p:transition>
+    </mc:Choice>
+    <mc:Fallback xmlns="">
       <p:transition spd="slow">
         <p:fade/>
       </p:transition>
@@ -5793,13 +5899,13 @@
   <p:clrMapOvr>
     <a:masterClrMapping/>
   </p:clrMapOvr>
-  <mc:AlternateContent xmlns:mc="http://schemas.openxmlformats.org/markup-compatibility/2006">
-    <mc:Choice xmlns:p14="http://schemas.microsoft.com/office/powerpoint/2010/main" Requires="p14">
+  <mc:AlternateContent xmlns:mc="http://schemas.openxmlformats.org/markup-compatibility/2006" xmlns:p14="http://schemas.microsoft.com/office/powerpoint/2010/main">
+    <mc:Choice Requires="p14">
       <p:transition spd="slow" p14:dur="3400">
         <p14:reveal/>
       </p:transition>
     </mc:Choice>
-    <mc:Fallback>
+    <mc:Fallback xmlns="">
       <p:transition spd="slow">
         <p:fade/>
       </p:transition>
@@ -5827,10 +5933,10 @@
       </p:grpSpPr>
       <p:sp>
         <p:nvSpPr>
-          <p:cNvPr id="9" name="Titre 8">
+          <p:cNvPr id="2" name="Titre 1">
             <a:extLst>
               <a:ext uri="{FF2B5EF4-FFF2-40B4-BE49-F238E27FC236}">
-                <a16:creationId xmlns:a16="http://schemas.microsoft.com/office/drawing/2014/main" id="{B49C79B1-18E1-4FE9-8F01-A900E84C7998}"/>
+                <a16:creationId xmlns:a16="http://schemas.microsoft.com/office/drawing/2014/main" id="{DD7C8BFF-90A8-4CB7-960B-63DF46971334}"/>
               </a:ext>
             </a:extLst>
           </p:cNvPr>
@@ -5848,74 +5954,17 @@
           <a:p>
             <a:r>
               <a:rPr lang="fr-FR" dirty="0"/>
-              <a:t>Exigences du projet</a:t>
-            </a:r>
-          </a:p>
-        </p:txBody>
-      </p:sp>
-      <p:sp>
-        <p:nvSpPr>
-          <p:cNvPr id="14" name="Espace réservé du contenu 13">
+              <a:t>Diagramme d’exigence du projet</a:t>
+            </a:r>
+          </a:p>
+        </p:txBody>
+      </p:sp>
+      <p:pic>
+        <p:nvPicPr>
+          <p:cNvPr id="7" name="Image 6">
             <a:extLst>
               <a:ext uri="{FF2B5EF4-FFF2-40B4-BE49-F238E27FC236}">
-                <a16:creationId xmlns:a16="http://schemas.microsoft.com/office/drawing/2014/main" id="{C17E18AE-D987-4752-B927-761C76CEE1AF}"/>
-              </a:ext>
-            </a:extLst>
-          </p:cNvPr>
-          <p:cNvSpPr>
-            <a:spLocks noGrp="1"/>
-          </p:cNvSpPr>
-          <p:nvPr>
-            <p:ph idx="1"/>
-          </p:nvPr>
-        </p:nvSpPr>
-        <p:spPr>
-          <a:xfrm>
-            <a:off x="1073151" y="2548467"/>
-            <a:ext cx="3547533" cy="3541184"/>
-          </a:xfrm>
-        </p:spPr>
-        <p:txBody>
-          <a:bodyPr/>
-          <a:lstStyle/>
-          <a:p>
-            <a:r>
-              <a:rPr lang="fr-FR" dirty="0"/>
-              <a:t>Récupérer les affaires en cours dans la BDD</a:t>
-            </a:r>
-          </a:p>
-          <a:p>
-            <a:r>
-              <a:rPr lang="fr-FR" dirty="0"/>
-              <a:t>Chargement de la BDD</a:t>
-            </a:r>
-          </a:p>
-          <a:p>
-            <a:r>
-              <a:rPr lang="fr-FR" dirty="0"/>
-              <a:t>Création de la liste des essais</a:t>
-            </a:r>
-          </a:p>
-          <a:p>
-            <a:r>
-              <a:rPr lang="fr-FR" dirty="0"/>
-              <a:t>Validation d’un essai</a:t>
-            </a:r>
-          </a:p>
-          <a:p>
-            <a:r>
-              <a:rPr lang="fr-FR" dirty="0"/>
-              <a:t>Gestion des listes d’essais</a:t>
-            </a:r>
-          </a:p>
-        </p:txBody>
-      </p:sp>
-      <p:pic>
-        <p:nvPicPr>
-          <p:cNvPr id="19" name="Image 18">
-            <a:extLst>
-              <a:ext uri="{FF2B5EF4-FFF2-40B4-BE49-F238E27FC236}">
-                <a16:creationId xmlns:a16="http://schemas.microsoft.com/office/drawing/2014/main" id="{C21E28EC-4EC7-4C9A-BC60-D53A63CE83A3}"/>
+                <a16:creationId xmlns:a16="http://schemas.microsoft.com/office/drawing/2014/main" id="{26621F93-1236-4C44-9C64-AE35645E9CAF}"/>
               </a:ext>
             </a:extLst>
           </p:cNvPr>
@@ -5932,8 +5981,8 @@
         </p:blipFill>
         <p:spPr>
           <a:xfrm>
-            <a:off x="5386782" y="793222"/>
-            <a:ext cx="6169692" cy="5116512"/>
+            <a:off x="88837" y="2755550"/>
+            <a:ext cx="12014324" cy="3280835"/>
           </a:xfrm>
           <a:prstGeom prst="rect">
             <a:avLst/>
@@ -5943,20 +5992,20 @@
     </p:spTree>
     <p:extLst>
       <p:ext uri="{BB962C8B-B14F-4D97-AF65-F5344CB8AC3E}">
-        <p14:creationId xmlns:p14="http://schemas.microsoft.com/office/powerpoint/2010/main" val="3346907511"/>
+        <p14:creationId xmlns:p14="http://schemas.microsoft.com/office/powerpoint/2010/main" val="2289715854"/>
       </p:ext>
     </p:extLst>
   </p:cSld>
   <p:clrMapOvr>
     <a:masterClrMapping/>
   </p:clrMapOvr>
-  <mc:AlternateContent xmlns:mc="http://schemas.openxmlformats.org/markup-compatibility/2006">
-    <mc:Choice xmlns:p14="http://schemas.microsoft.com/office/powerpoint/2010/main" Requires="p14">
+  <mc:AlternateContent xmlns:mc="http://schemas.openxmlformats.org/markup-compatibility/2006" xmlns:p14="http://schemas.microsoft.com/office/powerpoint/2010/main">
+    <mc:Choice Requires="p14">
       <p:transition spd="slow" p14:dur="3400">
         <p14:reveal/>
       </p:transition>
     </mc:Choice>
-    <mc:Fallback>
+    <mc:Fallback xmlns="">
       <p:transition spd="slow">
         <p:fade/>
       </p:transition>
@@ -6052,13 +6101,13 @@
   <p:clrMapOvr>
     <a:masterClrMapping/>
   </p:clrMapOvr>
-  <mc:AlternateContent xmlns:mc="http://schemas.openxmlformats.org/markup-compatibility/2006">
-    <mc:Choice xmlns:p14="http://schemas.microsoft.com/office/powerpoint/2010/main" Requires="p14">
+  <mc:AlternateContent xmlns:mc="http://schemas.openxmlformats.org/markup-compatibility/2006" xmlns:p14="http://schemas.microsoft.com/office/powerpoint/2010/main">
+    <mc:Choice Requires="p14">
       <p:transition spd="slow" p14:dur="3400">
         <p14:reveal/>
       </p:transition>
     </mc:Choice>
-    <mc:Fallback>
+    <mc:Fallback xmlns="">
       <p:transition spd="slow">
         <p:fade/>
       </p:transition>
@@ -6154,13 +6203,13 @@
   <p:clrMapOvr>
     <a:masterClrMapping/>
   </p:clrMapOvr>
-  <mc:AlternateContent xmlns:mc="http://schemas.openxmlformats.org/markup-compatibility/2006">
-    <mc:Choice xmlns:p14="http://schemas.microsoft.com/office/powerpoint/2010/main" Requires="p14">
+  <mc:AlternateContent xmlns:mc="http://schemas.openxmlformats.org/markup-compatibility/2006" xmlns:p14="http://schemas.microsoft.com/office/powerpoint/2010/main">
+    <mc:Choice Requires="p14">
       <p:transition spd="slow" p14:dur="3400">
         <p14:reveal/>
       </p:transition>
     </mc:Choice>
-    <mc:Fallback>
+    <mc:Fallback xmlns="">
       <p:transition spd="slow">
         <p:fade/>
       </p:transition>
@@ -6208,8 +6257,8 @@
         </p:blipFill>
         <p:spPr>
           <a:xfrm>
-            <a:off x="225180" y="168205"/>
-            <a:ext cx="9506439" cy="2711589"/>
+            <a:off x="570694" y="1852978"/>
+            <a:ext cx="11050611" cy="3152044"/>
           </a:xfrm>
           <a:prstGeom prst="rect">
             <a:avLst/>
@@ -6226,13 +6275,13 @@
   <p:clrMapOvr>
     <a:masterClrMapping/>
   </p:clrMapOvr>
-  <mc:AlternateContent xmlns:mc="http://schemas.openxmlformats.org/markup-compatibility/2006">
-    <mc:Choice xmlns:p14="http://schemas.microsoft.com/office/powerpoint/2010/main" Requires="p14">
+  <mc:AlternateContent xmlns:mc="http://schemas.openxmlformats.org/markup-compatibility/2006" xmlns:p14="http://schemas.microsoft.com/office/powerpoint/2010/main">
+    <mc:Choice Requires="p14">
       <p:transition spd="slow" p14:dur="3400">
         <p14:reveal/>
       </p:transition>
     </mc:Choice>
-    <mc:Fallback>
+    <mc:Fallback xmlns="">
       <p:transition spd="slow">
         <p:fade/>
       </p:transition>
@@ -6242,6 +6291,106 @@
 </file>
 
 <file path=ppt/slides/slide7.xml><?xml version="1.0" encoding="utf-8"?>
+<p:sld xmlns:a="http://schemas.openxmlformats.org/drawingml/2006/main" xmlns:r="http://schemas.openxmlformats.org/officeDocument/2006/relationships" xmlns:p="http://schemas.openxmlformats.org/presentationml/2006/main">
+  <p:cSld>
+    <p:spTree>
+      <p:nvGrpSpPr>
+        <p:cNvPr id="1" name=""/>
+        <p:cNvGrpSpPr/>
+        <p:nvPr/>
+      </p:nvGrpSpPr>
+      <p:grpSpPr>
+        <a:xfrm>
+          <a:off x="0" y="0"/>
+          <a:ext cx="0" cy="0"/>
+          <a:chOff x="0" y="0"/>
+          <a:chExt cx="0" cy="0"/>
+        </a:xfrm>
+      </p:grpSpPr>
+      <p:sp>
+        <p:nvSpPr>
+          <p:cNvPr id="9" name="Titre 8">
+            <a:extLst>
+              <a:ext uri="{FF2B5EF4-FFF2-40B4-BE49-F238E27FC236}">
+                <a16:creationId xmlns:a16="http://schemas.microsoft.com/office/drawing/2014/main" id="{B49C79B1-18E1-4FE9-8F01-A900E84C7998}"/>
+              </a:ext>
+            </a:extLst>
+          </p:cNvPr>
+          <p:cNvSpPr>
+            <a:spLocks noGrp="1"/>
+          </p:cNvSpPr>
+          <p:nvPr>
+            <p:ph type="title"/>
+          </p:nvPr>
+        </p:nvSpPr>
+        <p:spPr/>
+        <p:txBody>
+          <a:bodyPr/>
+          <a:lstStyle/>
+          <a:p>
+            <a:r>
+              <a:rPr lang="fr-FR" dirty="0"/>
+              <a:t>Diagramme d’exigence</a:t>
+            </a:r>
+          </a:p>
+        </p:txBody>
+      </p:sp>
+      <p:pic>
+        <p:nvPicPr>
+          <p:cNvPr id="3" name="Image 2">
+            <a:extLst>
+              <a:ext uri="{FF2B5EF4-FFF2-40B4-BE49-F238E27FC236}">
+                <a16:creationId xmlns:a16="http://schemas.microsoft.com/office/drawing/2014/main" id="{172683FE-8A1B-4990-9410-DD1692194C57}"/>
+              </a:ext>
+            </a:extLst>
+          </p:cNvPr>
+          <p:cNvPicPr>
+            <a:picLocks noChangeAspect="1"/>
+          </p:cNvPicPr>
+          <p:nvPr/>
+        </p:nvPicPr>
+        <p:blipFill>
+          <a:blip r:embed="rId2"/>
+          <a:stretch>
+            <a:fillRect/>
+          </a:stretch>
+        </p:blipFill>
+        <p:spPr>
+          <a:xfrm>
+            <a:off x="810000" y="2296745"/>
+            <a:ext cx="10116603" cy="4379262"/>
+          </a:xfrm>
+          <a:prstGeom prst="rect">
+            <a:avLst/>
+          </a:prstGeom>
+        </p:spPr>
+      </p:pic>
+    </p:spTree>
+    <p:extLst>
+      <p:ext uri="{BB962C8B-B14F-4D97-AF65-F5344CB8AC3E}">
+        <p14:creationId xmlns:p14="http://schemas.microsoft.com/office/powerpoint/2010/main" val="3346907511"/>
+      </p:ext>
+    </p:extLst>
+  </p:cSld>
+  <p:clrMapOvr>
+    <a:masterClrMapping/>
+  </p:clrMapOvr>
+  <mc:AlternateContent xmlns:mc="http://schemas.openxmlformats.org/markup-compatibility/2006" xmlns:p14="http://schemas.microsoft.com/office/powerpoint/2010/main">
+    <mc:Choice Requires="p14">
+      <p:transition spd="slow" p14:dur="3400">
+        <p14:reveal/>
+      </p:transition>
+    </mc:Choice>
+    <mc:Fallback xmlns="">
+      <p:transition spd="slow">
+        <p:fade/>
+      </p:transition>
+    </mc:Fallback>
+  </mc:AlternateContent>
+</p:sld>
+</file>
+
+<file path=ppt/slides/slide8.xml><?xml version="1.0" encoding="utf-8"?>
 <p:sld xmlns:a="http://schemas.openxmlformats.org/drawingml/2006/main" xmlns:r="http://schemas.openxmlformats.org/officeDocument/2006/relationships" xmlns:p="http://schemas.openxmlformats.org/presentationml/2006/main">
   <p:cSld>
     <p:spTree>
@@ -6386,13 +6535,13 @@
   <p:clrMapOvr>
     <a:masterClrMapping/>
   </p:clrMapOvr>
-  <mc:AlternateContent xmlns:mc="http://schemas.openxmlformats.org/markup-compatibility/2006">
-    <mc:Choice xmlns:p14="http://schemas.microsoft.com/office/powerpoint/2010/main" Requires="p14">
+  <mc:AlternateContent xmlns:mc="http://schemas.openxmlformats.org/markup-compatibility/2006" xmlns:p14="http://schemas.microsoft.com/office/powerpoint/2010/main">
+    <mc:Choice Requires="p14">
       <p:transition spd="slow" p14:dur="3400">
         <p14:reveal/>
       </p:transition>
     </mc:Choice>
-    <mc:Fallback>
+    <mc:Fallback xmlns="">
       <p:transition spd="slow">
         <p:fade/>
       </p:transition>
@@ -6757,106 +6906,6 @@
 </p:sld>
 </file>
 
-<file path=ppt/slides/slide8.xml><?xml version="1.0" encoding="utf-8"?>
-<p:sld xmlns:a="http://schemas.openxmlformats.org/drawingml/2006/main" xmlns:r="http://schemas.openxmlformats.org/officeDocument/2006/relationships" xmlns:p="http://schemas.openxmlformats.org/presentationml/2006/main">
-  <p:cSld>
-    <p:spTree>
-      <p:nvGrpSpPr>
-        <p:cNvPr id="1" name=""/>
-        <p:cNvGrpSpPr/>
-        <p:nvPr/>
-      </p:nvGrpSpPr>
-      <p:grpSpPr>
-        <a:xfrm>
-          <a:off x="0" y="0"/>
-          <a:ext cx="0" cy="0"/>
-          <a:chOff x="0" y="0"/>
-          <a:chExt cx="0" cy="0"/>
-        </a:xfrm>
-      </p:grpSpPr>
-      <p:sp>
-        <p:nvSpPr>
-          <p:cNvPr id="2" name="Titre 1">
-            <a:extLst>
-              <a:ext uri="{FF2B5EF4-FFF2-40B4-BE49-F238E27FC236}">
-                <a16:creationId xmlns:a16="http://schemas.microsoft.com/office/drawing/2014/main" id="{DD7C8BFF-90A8-4CB7-960B-63DF46971334}"/>
-              </a:ext>
-            </a:extLst>
-          </p:cNvPr>
-          <p:cNvSpPr>
-            <a:spLocks noGrp="1"/>
-          </p:cNvSpPr>
-          <p:nvPr>
-            <p:ph type="title"/>
-          </p:nvPr>
-        </p:nvSpPr>
-        <p:spPr/>
-        <p:txBody>
-          <a:bodyPr/>
-          <a:lstStyle/>
-          <a:p>
-            <a:r>
-              <a:rPr lang="fr-FR" dirty="0"/>
-              <a:t>Diagramme d’exigence du projet</a:t>
-            </a:r>
-          </a:p>
-        </p:txBody>
-      </p:sp>
-      <p:pic>
-        <p:nvPicPr>
-          <p:cNvPr id="6" name="Image 5">
-            <a:extLst>
-              <a:ext uri="{FF2B5EF4-FFF2-40B4-BE49-F238E27FC236}">
-                <a16:creationId xmlns:a16="http://schemas.microsoft.com/office/drawing/2014/main" id="{3C74F280-E597-471B-8CD0-268B0E585E6C}"/>
-              </a:ext>
-            </a:extLst>
-          </p:cNvPr>
-          <p:cNvPicPr>
-            <a:picLocks noChangeAspect="1"/>
-          </p:cNvPicPr>
-          <p:nvPr/>
-        </p:nvPicPr>
-        <p:blipFill>
-          <a:blip r:embed="rId2"/>
-          <a:stretch>
-            <a:fillRect/>
-          </a:stretch>
-        </p:blipFill>
-        <p:spPr>
-          <a:xfrm>
-            <a:off x="3090198" y="2116558"/>
-            <a:ext cx="5283472" cy="4216617"/>
-          </a:xfrm>
-          <a:prstGeom prst="rect">
-            <a:avLst/>
-          </a:prstGeom>
-        </p:spPr>
-      </p:pic>
-    </p:spTree>
-    <p:extLst>
-      <p:ext uri="{BB962C8B-B14F-4D97-AF65-F5344CB8AC3E}">
-        <p14:creationId xmlns:p14="http://schemas.microsoft.com/office/powerpoint/2010/main" val="2289715854"/>
-      </p:ext>
-    </p:extLst>
-  </p:cSld>
-  <p:clrMapOvr>
-    <a:masterClrMapping/>
-  </p:clrMapOvr>
-  <mc:AlternateContent xmlns:mc="http://schemas.openxmlformats.org/markup-compatibility/2006">
-    <mc:Choice xmlns:p14="http://schemas.microsoft.com/office/powerpoint/2010/main" Requires="p14">
-      <p:transition spd="slow" p14:dur="3400">
-        <p14:reveal/>
-      </p:transition>
-    </mc:Choice>
-    <mc:Fallback>
-      <p:transition spd="slow">
-        <p:fade/>
-      </p:transition>
-    </mc:Fallback>
-  </mc:AlternateContent>
-</p:sld>
-</file>
-
 <file path=ppt/slides/slide9.xml><?xml version="1.0" encoding="utf-8"?>
 <p:sld xmlns:a="http://schemas.openxmlformats.org/drawingml/2006/main" xmlns:r="http://schemas.openxmlformats.org/officeDocument/2006/relationships" xmlns:p="http://schemas.openxmlformats.org/presentationml/2006/main">
   <p:cSld>
@@ -6972,13 +7021,13 @@
   <p:clrMapOvr>
     <a:masterClrMapping/>
   </p:clrMapOvr>
-  <mc:AlternateContent xmlns:mc="http://schemas.openxmlformats.org/markup-compatibility/2006">
-    <mc:Choice xmlns:p14="http://schemas.microsoft.com/office/powerpoint/2010/main" Requires="p14">
+  <mc:AlternateContent xmlns:mc="http://schemas.openxmlformats.org/markup-compatibility/2006" xmlns:p14="http://schemas.microsoft.com/office/powerpoint/2010/main">
+    <mc:Choice Requires="p14">
       <p:transition spd="slow" p14:dur="3400">
         <p14:reveal/>
       </p:transition>
     </mc:Choice>
-    <mc:Fallback>
+    <mc:Fallback xmlns="">
       <p:transition spd="slow">
         <p:fade/>
       </p:transition>

</xml_diff>